<commit_message>
update v3:create RankingActivity and StatisticsActivity
</commit_message>
<xml_diff>
--- a/Ace/Document/DBアプリ仕様.pptx
+++ b/Ace/Document/DBアプリ仕様.pptx
@@ -248,7 +248,7 @@
           <a:p>
             <a:fld id="{29FBD565-AFE4-4814-ABF1-720C6BF6CB66}" type="datetimeFigureOut">
               <a:rPr kumimoji="1" lang="ja-JP" altLang="en-US" smtClean="0"/>
-              <a:t>2021/11/26</a:t>
+              <a:t>2021/12/17</a:t>
             </a:fld>
             <a:endParaRPr kumimoji="1" lang="ja-JP" altLang="en-US"/>
           </a:p>
@@ -450,7 +450,7 @@
           <a:p>
             <a:fld id="{29FBD565-AFE4-4814-ABF1-720C6BF6CB66}" type="datetimeFigureOut">
               <a:rPr kumimoji="1" lang="ja-JP" altLang="en-US" smtClean="0"/>
-              <a:t>2021/11/26</a:t>
+              <a:t>2021/12/17</a:t>
             </a:fld>
             <a:endParaRPr kumimoji="1" lang="ja-JP" altLang="en-US"/>
           </a:p>
@@ -662,7 +662,7 @@
           <a:p>
             <a:fld id="{29FBD565-AFE4-4814-ABF1-720C6BF6CB66}" type="datetimeFigureOut">
               <a:rPr kumimoji="1" lang="ja-JP" altLang="en-US" smtClean="0"/>
-              <a:t>2021/11/26</a:t>
+              <a:t>2021/12/17</a:t>
             </a:fld>
             <a:endParaRPr kumimoji="1" lang="ja-JP" altLang="en-US"/>
           </a:p>
@@ -864,7 +864,7 @@
           <a:p>
             <a:fld id="{29FBD565-AFE4-4814-ABF1-720C6BF6CB66}" type="datetimeFigureOut">
               <a:rPr kumimoji="1" lang="ja-JP" altLang="en-US" smtClean="0"/>
-              <a:t>2021/11/26</a:t>
+              <a:t>2021/12/17</a:t>
             </a:fld>
             <a:endParaRPr kumimoji="1" lang="ja-JP" altLang="en-US"/>
           </a:p>
@@ -1108,7 +1108,7 @@
           <a:p>
             <a:fld id="{29FBD565-AFE4-4814-ABF1-720C6BF6CB66}" type="datetimeFigureOut">
               <a:rPr kumimoji="1" lang="ja-JP" altLang="en-US" smtClean="0"/>
-              <a:t>2021/11/26</a:t>
+              <a:t>2021/12/17</a:t>
             </a:fld>
             <a:endParaRPr kumimoji="1" lang="ja-JP" altLang="en-US"/>
           </a:p>
@@ -1404,7 +1404,7 @@
           <a:p>
             <a:fld id="{29FBD565-AFE4-4814-ABF1-720C6BF6CB66}" type="datetimeFigureOut">
               <a:rPr kumimoji="1" lang="ja-JP" altLang="en-US" smtClean="0"/>
-              <a:t>2021/11/26</a:t>
+              <a:t>2021/12/17</a:t>
             </a:fld>
             <a:endParaRPr kumimoji="1" lang="ja-JP" altLang="en-US"/>
           </a:p>
@@ -1835,7 +1835,7 @@
           <a:p>
             <a:fld id="{29FBD565-AFE4-4814-ABF1-720C6BF6CB66}" type="datetimeFigureOut">
               <a:rPr kumimoji="1" lang="ja-JP" altLang="en-US" smtClean="0"/>
-              <a:t>2021/11/26</a:t>
+              <a:t>2021/12/17</a:t>
             </a:fld>
             <a:endParaRPr kumimoji="1" lang="ja-JP" altLang="en-US"/>
           </a:p>
@@ -1953,7 +1953,7 @@
           <a:p>
             <a:fld id="{29FBD565-AFE4-4814-ABF1-720C6BF6CB66}" type="datetimeFigureOut">
               <a:rPr kumimoji="1" lang="ja-JP" altLang="en-US" smtClean="0"/>
-              <a:t>2021/11/26</a:t>
+              <a:t>2021/12/17</a:t>
             </a:fld>
             <a:endParaRPr kumimoji="1" lang="ja-JP" altLang="en-US"/>
           </a:p>
@@ -2048,7 +2048,7 @@
           <a:p>
             <a:fld id="{29FBD565-AFE4-4814-ABF1-720C6BF6CB66}" type="datetimeFigureOut">
               <a:rPr kumimoji="1" lang="ja-JP" altLang="en-US" smtClean="0"/>
-              <a:t>2021/11/26</a:t>
+              <a:t>2021/12/17</a:t>
             </a:fld>
             <a:endParaRPr kumimoji="1" lang="ja-JP" altLang="en-US"/>
           </a:p>
@@ -2357,7 +2357,7 @@
           <a:p>
             <a:fld id="{29FBD565-AFE4-4814-ABF1-720C6BF6CB66}" type="datetimeFigureOut">
               <a:rPr kumimoji="1" lang="ja-JP" altLang="en-US" smtClean="0"/>
-              <a:t>2021/11/26</a:t>
+              <a:t>2021/12/17</a:t>
             </a:fld>
             <a:endParaRPr kumimoji="1" lang="ja-JP" altLang="en-US"/>
           </a:p>
@@ -2614,7 +2614,7 @@
           <a:p>
             <a:fld id="{29FBD565-AFE4-4814-ABF1-720C6BF6CB66}" type="datetimeFigureOut">
               <a:rPr kumimoji="1" lang="ja-JP" altLang="en-US" smtClean="0"/>
-              <a:t>2021/11/26</a:t>
+              <a:t>2021/12/17</a:t>
             </a:fld>
             <a:endParaRPr kumimoji="1" lang="ja-JP" altLang="en-US"/>
           </a:p>
@@ -2859,7 +2859,7 @@
           <a:p>
             <a:fld id="{29FBD565-AFE4-4814-ABF1-720C6BF6CB66}" type="datetimeFigureOut">
               <a:rPr kumimoji="1" lang="ja-JP" altLang="en-US" smtClean="0"/>
-              <a:t>2021/11/26</a:t>
+              <a:t>2021/12/17</a:t>
             </a:fld>
             <a:endParaRPr kumimoji="1" lang="ja-JP" altLang="en-US"/>
           </a:p>
@@ -3712,11 +3712,7 @@
             <a:pPr lvl="2"/>
             <a:r>
               <a:rPr kumimoji="1" lang="ja-JP" altLang="en-US" dirty="0" smtClean="0"/>
-              <a:t>ランキング上位に入ってエースになろう</a:t>
-            </a:r>
-            <a:r>
-              <a:rPr kumimoji="1" lang="ja-JP" altLang="en-US" dirty="0" smtClean="0"/>
-              <a:t>！</a:t>
+              <a:t>ランキング上位に入ってエースになろう！</a:t>
             </a:r>
             <a:endParaRPr kumimoji="1" lang="en-US" altLang="ja-JP" dirty="0" smtClean="0"/>
           </a:p>
@@ -3993,10 +3989,136 @@
         </p:nvSpPr>
         <p:spPr/>
         <p:txBody>
-          <a:bodyPr/>
-          <a:lstStyle/>
-          <a:p>
-            <a:endParaRPr kumimoji="1" lang="ja-JP" altLang="en-US"/>
+          <a:bodyPr>
+            <a:normAutofit lnSpcReduction="10000"/>
+          </a:bodyPr>
+          <a:lstStyle/>
+          <a:p>
+            <a:r>
+              <a:rPr kumimoji="1" lang="ja-JP" altLang="en-US" dirty="0" smtClean="0"/>
+              <a:t>画面の描画</a:t>
+            </a:r>
+            <a:endParaRPr kumimoji="1" lang="en-US" altLang="ja-JP" dirty="0" smtClean="0"/>
+          </a:p>
+          <a:p>
+            <a:pPr lvl="1"/>
+            <a:r>
+              <a:rPr kumimoji="1" lang="ja-JP" altLang="en-US" dirty="0" smtClean="0"/>
+              <a:t>パズルの部分で駒を一度にたくさん動かそう</a:t>
+            </a:r>
+            <a:r>
+              <a:rPr kumimoji="1" lang="en-US" altLang="ja-JP" dirty="0" smtClean="0"/>
+              <a:t/>
+            </a:r>
+            <a:br>
+              <a:rPr kumimoji="1" lang="en-US" altLang="ja-JP" dirty="0" smtClean="0"/>
+            </a:br>
+            <a:r>
+              <a:rPr kumimoji="1" lang="ja-JP" altLang="en-US" dirty="0" smtClean="0"/>
+              <a:t>とすると処理落ちする。</a:t>
+            </a:r>
+            <a:endParaRPr kumimoji="1" lang="en-US" altLang="ja-JP" dirty="0" smtClean="0"/>
+          </a:p>
+          <a:p>
+            <a:pPr lvl="2"/>
+            <a:r>
+              <a:rPr lang="en-US" altLang="ja-JP" dirty="0" err="1" smtClean="0"/>
+              <a:t>SurfaceView</a:t>
+            </a:r>
+            <a:r>
+              <a:rPr lang="ja-JP" altLang="en-US" dirty="0" smtClean="0"/>
+              <a:t>を使い別スレッドで描画するようにした。</a:t>
+            </a:r>
+            <a:endParaRPr kumimoji="1" lang="en-US" altLang="ja-JP" dirty="0" smtClean="0"/>
+          </a:p>
+          <a:p>
+            <a:r>
+              <a:rPr kumimoji="1" lang="en-US" altLang="ja-JP" dirty="0" smtClean="0"/>
+              <a:t>SQLite</a:t>
+            </a:r>
+            <a:r>
+              <a:rPr kumimoji="1" lang="ja-JP" altLang="en-US" dirty="0" smtClean="0"/>
+              <a:t>の部分</a:t>
+            </a:r>
+            <a:endParaRPr kumimoji="1" lang="en-US" altLang="ja-JP" dirty="0" smtClean="0"/>
+          </a:p>
+          <a:p>
+            <a:pPr lvl="1"/>
+            <a:r>
+              <a:rPr kumimoji="1" lang="ja-JP" altLang="en-US" dirty="0" smtClean="0"/>
+              <a:t>クエリをどのクラス、メソッドで発行するのか</a:t>
+            </a:r>
+            <a:r>
+              <a:rPr kumimoji="1" lang="en-US" altLang="ja-JP" dirty="0" smtClean="0"/>
+              <a:t/>
+            </a:r>
+            <a:br>
+              <a:rPr kumimoji="1" lang="en-US" altLang="ja-JP" dirty="0" smtClean="0"/>
+            </a:br>
+            <a:r>
+              <a:rPr kumimoji="1" lang="ja-JP" altLang="en-US" dirty="0" smtClean="0"/>
+              <a:t>考えるのに苦労した。</a:t>
+            </a:r>
+            <a:endParaRPr kumimoji="1" lang="en-US" altLang="ja-JP" dirty="0" smtClean="0"/>
+          </a:p>
+          <a:p>
+            <a:pPr lvl="2"/>
+            <a:r>
+              <a:rPr lang="en-US" altLang="ja-JP" dirty="0" smtClean="0"/>
+              <a:t>Table</a:t>
+            </a:r>
+            <a:r>
+              <a:rPr lang="ja-JP" altLang="en-US" dirty="0" smtClean="0"/>
+              <a:t>の</a:t>
+            </a:r>
+            <a:r>
+              <a:rPr lang="en-US" altLang="ja-JP" dirty="0" smtClean="0"/>
+              <a:t>Record</a:t>
+            </a:r>
+            <a:r>
+              <a:rPr lang="ja-JP" altLang="en-US" dirty="0" smtClean="0"/>
+              <a:t>を格納するクラスの中に</a:t>
+            </a:r>
+            <a:r>
+              <a:rPr lang="en-US" altLang="ja-JP" dirty="0" smtClean="0"/>
+              <a:t>Query</a:t>
+            </a:r>
+            <a:r>
+              <a:rPr lang="ja-JP" altLang="en-US" dirty="0" smtClean="0"/>
+              <a:t>クラスを作ってそこでクエリ発行→インスタンス作成をした。</a:t>
+            </a:r>
+            <a:endParaRPr kumimoji="1" lang="en-US" altLang="ja-JP" dirty="0" smtClean="0"/>
+          </a:p>
+          <a:p>
+            <a:r>
+              <a:rPr lang="en-US" altLang="ja-JP" dirty="0" err="1" smtClean="0"/>
+              <a:t>ListView</a:t>
+            </a:r>
+            <a:r>
+              <a:rPr lang="ja-JP" altLang="en-US" dirty="0" smtClean="0"/>
+              <a:t>の部分</a:t>
+            </a:r>
+            <a:endParaRPr lang="en-US" altLang="ja-JP" dirty="0" smtClean="0"/>
+          </a:p>
+          <a:p>
+            <a:pPr lvl="1"/>
+            <a:r>
+              <a:rPr kumimoji="1" lang="en-US" altLang="ja-JP" dirty="0" smtClean="0"/>
+              <a:t>Adapter</a:t>
+            </a:r>
+            <a:r>
+              <a:rPr lang="ja-JP" altLang="en-US" smtClean="0"/>
+              <a:t>の作成が</a:t>
+            </a:r>
+            <a:r>
+              <a:rPr kumimoji="1" lang="en-US" altLang="ja-JP" smtClean="0"/>
+              <a:t>Activity</a:t>
+            </a:r>
+            <a:r>
+              <a:rPr lang="ja-JP" altLang="en-US" dirty="0" smtClean="0"/>
+              <a:t>を作る程度の作業量があり、時間がかかった。</a:t>
+            </a:r>
+            <a:endParaRPr kumimoji="1" lang="ja-JP" altLang="en-US" dirty="0"/>
           </a:p>
         </p:txBody>
       </p:sp>
@@ -4068,7 +4190,103 @@
           <a:bodyPr/>
           <a:lstStyle/>
           <a:p>
-            <a:endParaRPr kumimoji="1" lang="ja-JP" altLang="en-US"/>
+            <a:r>
+              <a:rPr kumimoji="1" lang="ja-JP" altLang="en-US" dirty="0" smtClean="0"/>
+              <a:t>駒の動かしかた</a:t>
+            </a:r>
+            <a:endParaRPr kumimoji="1" lang="en-US" altLang="ja-JP" dirty="0" smtClean="0"/>
+          </a:p>
+          <a:p>
+            <a:pPr lvl="1"/>
+            <a:r>
+              <a:rPr lang="ja-JP" altLang="en-US" dirty="0" smtClean="0"/>
+              <a:t>動かしたい駒をタッチするだけではなく、</a:t>
+            </a:r>
+            <a:r>
+              <a:rPr lang="en-US" altLang="ja-JP" dirty="0" smtClean="0"/>
+              <a:t/>
+            </a:r>
+            <a:br>
+              <a:rPr lang="en-US" altLang="ja-JP" dirty="0" smtClean="0"/>
+            </a:br>
+            <a:r>
+              <a:rPr lang="ja-JP" altLang="en-US" dirty="0" smtClean="0"/>
+              <a:t>なぞりながら触れるだけで移動できる。</a:t>
+            </a:r>
+            <a:endParaRPr lang="en-US" altLang="ja-JP" dirty="0" smtClean="0"/>
+          </a:p>
+          <a:p>
+            <a:r>
+              <a:rPr lang="ja-JP" altLang="en-US" dirty="0"/>
+              <a:t>駒の</a:t>
+            </a:r>
+            <a:r>
+              <a:rPr lang="ja-JP" altLang="en-US" dirty="0" smtClean="0"/>
+              <a:t>グラフィック</a:t>
+            </a:r>
+            <a:endParaRPr lang="en-US" altLang="ja-JP" dirty="0" smtClean="0"/>
+          </a:p>
+          <a:p>
+            <a:pPr lvl="1"/>
+            <a:r>
+              <a:rPr lang="ja-JP" altLang="en-US" dirty="0" smtClean="0"/>
+              <a:t>数字を１つ１つペイントソフトで</a:t>
+            </a:r>
+            <a:r>
+              <a:rPr lang="en-US" altLang="ja-JP" dirty="0" smtClean="0"/>
+              <a:t/>
+            </a:r>
+            <a:br>
+              <a:rPr lang="en-US" altLang="ja-JP" dirty="0" smtClean="0"/>
+            </a:br>
+            <a:r>
+              <a:rPr lang="ja-JP" altLang="en-US" dirty="0" smtClean="0"/>
+              <a:t>きれいなグラデーションになるように加工した。</a:t>
+            </a:r>
+            <a:endParaRPr lang="en-US" altLang="ja-JP" dirty="0" smtClean="0"/>
+          </a:p>
+          <a:p>
+            <a:r>
+              <a:rPr lang="ja-JP" altLang="en-US" dirty="0" smtClean="0"/>
+              <a:t>リアルタイム感</a:t>
+            </a:r>
+            <a:endParaRPr lang="en-US" altLang="ja-JP" dirty="0" smtClean="0"/>
+          </a:p>
+          <a:p>
+            <a:pPr lvl="1"/>
+            <a:r>
+              <a:rPr lang="ja-JP" altLang="en-US" dirty="0" smtClean="0"/>
+              <a:t>個人製作のパズルはクリアするまで</a:t>
+            </a:r>
+            <a:r>
+              <a:rPr lang="en-US" altLang="ja-JP" dirty="0" smtClean="0"/>
+              <a:t/>
+            </a:r>
+            <a:br>
+              <a:rPr lang="en-US" altLang="ja-JP" dirty="0" smtClean="0"/>
+            </a:br>
+            <a:r>
+              <a:rPr lang="ja-JP" altLang="en-US" dirty="0" smtClean="0"/>
+              <a:t>時間がわからなかったが、</a:t>
+            </a:r>
+            <a:r>
+              <a:rPr lang="en-US" altLang="ja-JP" dirty="0"/>
+              <a:t/>
+            </a:r>
+            <a:br>
+              <a:rPr lang="en-US" altLang="ja-JP" dirty="0"/>
+            </a:br>
+            <a:r>
+              <a:rPr lang="ja-JP" altLang="en-US" dirty="0" smtClean="0"/>
+              <a:t>パズル中の時間がリアルタイムで表示される。</a:t>
+            </a:r>
+            <a:endParaRPr lang="en-US" altLang="ja-JP" dirty="0" smtClean="0"/>
+          </a:p>
+          <a:p>
+            <a:pPr marL="0" indent="0">
+              <a:buNone/>
+            </a:pPr>
+            <a:endParaRPr lang="en-US" altLang="ja-JP" dirty="0" smtClean="0"/>
           </a:p>
         </p:txBody>
       </p:sp>

</xml_diff>